<commit_message>
add several dma mode and dma channel arbitration theory
</commit_message>
<xml_diff>
--- a/theory/dma_controller.pptx
+++ b/theory/dma_controller.pptx
@@ -5,13 +5,17 @@
     <p:sldMasterId id="2147483648" r:id="rId1"/>
   </p:sldMasterIdLst>
   <p:notesMasterIdLst>
-    <p:notesMasterId r:id="rId6"/>
+    <p:notesMasterId r:id="rId10"/>
   </p:notesMasterIdLst>
   <p:sldIdLst>
     <p:sldId id="256" r:id="rId2"/>
     <p:sldId id="257" r:id="rId3"/>
     <p:sldId id="258" r:id="rId4"/>
     <p:sldId id="259" r:id="rId5"/>
+    <p:sldId id="260" r:id="rId6"/>
+    <p:sldId id="261" r:id="rId7"/>
+    <p:sldId id="262" r:id="rId8"/>
+    <p:sldId id="263" r:id="rId9"/>
   </p:sldIdLst>
   <p:sldSz cx="12192000" cy="6858000"/>
   <p:notesSz cx="6858000" cy="9144000"/>
@@ -211,7 +215,7 @@
           <a:p>
             <a:fld id="{58532C1C-6881-4E29-9FBE-3ED9764DF568}" type="datetimeFigureOut">
               <a:rPr lang="en-US" smtClean="0"/>
-              <a:t>2/4/2023</a:t>
+              <a:t>2/7/2023</a:t>
             </a:fld>
             <a:endParaRPr lang="en-US"/>
           </a:p>
@@ -4425,15 +4429,7 @@
             <a:pPr algn="just"/>
             <a:r>
               <a:rPr lang="en-US" sz="1600" dirty="0" smtClean="0"/>
-              <a:t>How a </a:t>
-            </a:r>
-            <a:r>
-              <a:rPr lang="en-US" sz="1600" dirty="0" smtClean="0"/>
-              <a:t>DMA </a:t>
-            </a:r>
-            <a:r>
-              <a:rPr lang="en-US" sz="1600" dirty="0" smtClean="0"/>
-              <a:t>transfer works:</a:t>
+              <a:t>How a DMA transfer works:</a:t>
             </a:r>
           </a:p>
           <a:p>
@@ -5604,7 +5600,6 @@
               <a:rPr lang="en-US" sz="1200" dirty="0"/>
               <a:t>Interface Unit (PIU): This component is responsible for interfacing with the peripheral device, and it provides the necessary control signals and data signals to initiate and control the data transfer.</a:t>
             </a:r>
-            <a:endParaRPr lang="en-US" sz="1200" dirty="0"/>
           </a:p>
         </p:txBody>
       </p:sp>
@@ -7275,6 +7270,683 @@
     <p:extLst>
       <p:ext uri="{BB962C8B-B14F-4D97-AF65-F5344CB8AC3E}">
         <p14:creationId xmlns:p14="http://schemas.microsoft.com/office/powerpoint/2010/main" val="1120673044"/>
+      </p:ext>
+    </p:extLst>
+  </p:cSld>
+  <p:clrMapOvr>
+    <a:masterClrMapping/>
+  </p:clrMapOvr>
+</p:sld>
+</file>
+
+<file path=ppt/slides/slide5.xml><?xml version="1.0" encoding="utf-8"?>
+<p:sld xmlns:a="http://schemas.openxmlformats.org/drawingml/2006/main" xmlns:r="http://schemas.openxmlformats.org/officeDocument/2006/relationships" xmlns:p="http://schemas.openxmlformats.org/presentationml/2006/main">
+  <p:cSld>
+    <p:spTree>
+      <p:nvGrpSpPr>
+        <p:cNvPr id="1" name=""/>
+        <p:cNvGrpSpPr/>
+        <p:nvPr/>
+      </p:nvGrpSpPr>
+      <p:grpSpPr>
+        <a:xfrm>
+          <a:off x="0" y="0"/>
+          <a:ext cx="0" cy="0"/>
+          <a:chOff x="0" y="0"/>
+          <a:chExt cx="0" cy="0"/>
+        </a:xfrm>
+      </p:grpSpPr>
+      <p:sp>
+        <p:nvSpPr>
+          <p:cNvPr id="2" name="Title 1"/>
+          <p:cNvSpPr>
+            <a:spLocks noGrp="1"/>
+          </p:cNvSpPr>
+          <p:nvPr>
+            <p:ph type="title"/>
+          </p:nvPr>
+        </p:nvSpPr>
+        <p:spPr/>
+        <p:txBody>
+          <a:bodyPr>
+            <a:normAutofit fontScale="90000"/>
+          </a:bodyPr>
+          <a:lstStyle/>
+          <a:p>
+            <a:r>
+              <a:rPr lang="en-US" dirty="0" smtClean="0"/>
+              <a:t>DMA handshake mode</a:t>
+            </a:r>
+            <a:endParaRPr lang="en-US" dirty="0"/>
+          </a:p>
+        </p:txBody>
+      </p:sp>
+      <p:sp>
+        <p:nvSpPr>
+          <p:cNvPr id="3" name="Slide Number Placeholder 2"/>
+          <p:cNvSpPr>
+            <a:spLocks noGrp="1"/>
+          </p:cNvSpPr>
+          <p:nvPr>
+            <p:ph type="sldNum" sz="quarter" idx="12"/>
+          </p:nvPr>
+        </p:nvSpPr>
+        <p:spPr/>
+        <p:txBody>
+          <a:bodyPr/>
+          <a:lstStyle/>
+          <a:p>
+            <a:fld id="{8D2190A9-F7E3-4F14-B6E3-11E229756979}" type="slidenum">
+              <a:rPr lang="en-US" smtClean="0"/>
+              <a:t>5</a:t>
+            </a:fld>
+            <a:endParaRPr lang="en-US" dirty="0"/>
+          </a:p>
+        </p:txBody>
+      </p:sp>
+      <p:sp>
+        <p:nvSpPr>
+          <p:cNvPr id="4" name="Rectangle 3"/>
+          <p:cNvSpPr/>
+          <p:nvPr/>
+        </p:nvSpPr>
+        <p:spPr>
+          <a:xfrm>
+            <a:off x="607512" y="474345"/>
+            <a:ext cx="10970930" cy="3693319"/>
+          </a:xfrm>
+          <a:prstGeom prst="rect">
+            <a:avLst/>
+          </a:prstGeom>
+        </p:spPr>
+        <p:txBody>
+          <a:bodyPr wrap="square">
+            <a:spAutoFit/>
+          </a:bodyPr>
+          <a:lstStyle/>
+          <a:p>
+            <a:pPr marL="285750" indent="-285750" algn="just">
+              <a:buFont typeface="Arial" panose="020B0604020202020204" pitchFamily="34" charset="0"/>
+              <a:buChar char="•"/>
+            </a:pPr>
+            <a:r>
+              <a:rPr lang="en-US" dirty="0"/>
+              <a:t>DMA handshake mode is a mechanism used in DMA (Direct Memory Access) transfers to coordinate the transfer of data between the peripheral device and the memory. It involves the exchange of control signals between the DMA controller and the peripheral device to initiate and control the transfer of data.</a:t>
+            </a:r>
+          </a:p>
+          <a:p>
+            <a:pPr marL="285750" indent="-285750" algn="just">
+              <a:buFont typeface="Arial" panose="020B0604020202020204" pitchFamily="34" charset="0"/>
+              <a:buChar char="•"/>
+            </a:pPr>
+            <a:endParaRPr lang="en-US" dirty="0"/>
+          </a:p>
+          <a:p>
+            <a:pPr marL="285750" indent="-285750" algn="just">
+              <a:buFont typeface="Arial" panose="020B0604020202020204" pitchFamily="34" charset="0"/>
+              <a:buChar char="•"/>
+            </a:pPr>
+            <a:r>
+              <a:rPr lang="en-US" dirty="0"/>
+              <a:t>In DMA handshake mode, the peripheral device generates a request signal to indicate that it needs to transfer data. The DMA controller, upon receiving the request, generates a grant signal to indicate that the bus is available for the transfer. The peripheral device then initiates the transfer of data, and the DMA controller monitors the transfer to ensure that it is completed correctly. Upon completion, the DMA controller generates a transfer complete signal to indicate that the transfer is finished, and the peripheral device releases the bus.</a:t>
+            </a:r>
+          </a:p>
+          <a:p>
+            <a:pPr marL="285750" indent="-285750" algn="just">
+              <a:buFont typeface="Arial" panose="020B0604020202020204" pitchFamily="34" charset="0"/>
+              <a:buChar char="•"/>
+            </a:pPr>
+            <a:endParaRPr lang="en-US" dirty="0"/>
+          </a:p>
+          <a:p>
+            <a:pPr marL="285750" indent="-285750" algn="just">
+              <a:buFont typeface="Arial" panose="020B0604020202020204" pitchFamily="34" charset="0"/>
+              <a:buChar char="•"/>
+            </a:pPr>
+            <a:r>
+              <a:rPr lang="en-US" dirty="0"/>
+              <a:t>The DMA handshake mode helps to ensure that the transfer of data is performed in a controlled and efficient manner, and it provides a mechanism for the peripheral device and the DMA controller to communicate and coordinate the transfer of data.</a:t>
+            </a:r>
+          </a:p>
+        </p:txBody>
+      </p:sp>
+    </p:spTree>
+    <p:extLst>
+      <p:ext uri="{BB962C8B-B14F-4D97-AF65-F5344CB8AC3E}">
+        <p14:creationId xmlns:p14="http://schemas.microsoft.com/office/powerpoint/2010/main" val="1897376669"/>
+      </p:ext>
+    </p:extLst>
+  </p:cSld>
+  <p:clrMapOvr>
+    <a:masterClrMapping/>
+  </p:clrMapOvr>
+</p:sld>
+</file>
+
+<file path=ppt/slides/slide6.xml><?xml version="1.0" encoding="utf-8"?>
+<p:sld xmlns:a="http://schemas.openxmlformats.org/drawingml/2006/main" xmlns:r="http://schemas.openxmlformats.org/officeDocument/2006/relationships" xmlns:p="http://schemas.openxmlformats.org/presentationml/2006/main">
+  <p:cSld>
+    <p:spTree>
+      <p:nvGrpSpPr>
+        <p:cNvPr id="1" name=""/>
+        <p:cNvGrpSpPr/>
+        <p:nvPr/>
+      </p:nvGrpSpPr>
+      <p:grpSpPr>
+        <a:xfrm>
+          <a:off x="0" y="0"/>
+          <a:ext cx="0" cy="0"/>
+          <a:chOff x="0" y="0"/>
+          <a:chExt cx="0" cy="0"/>
+        </a:xfrm>
+      </p:grpSpPr>
+      <p:sp>
+        <p:nvSpPr>
+          <p:cNvPr id="2" name="Title 1"/>
+          <p:cNvSpPr>
+            <a:spLocks noGrp="1"/>
+          </p:cNvSpPr>
+          <p:nvPr>
+            <p:ph type="title"/>
+          </p:nvPr>
+        </p:nvSpPr>
+        <p:spPr/>
+        <p:txBody>
+          <a:bodyPr>
+            <a:normAutofit fontScale="90000"/>
+          </a:bodyPr>
+          <a:lstStyle/>
+          <a:p>
+            <a:r>
+              <a:rPr lang="en-US" dirty="0" smtClean="0"/>
+              <a:t>DMA normal mode</a:t>
+            </a:r>
+            <a:endParaRPr lang="en-US" dirty="0"/>
+          </a:p>
+        </p:txBody>
+      </p:sp>
+      <p:sp>
+        <p:nvSpPr>
+          <p:cNvPr id="3" name="Slide Number Placeholder 2"/>
+          <p:cNvSpPr>
+            <a:spLocks noGrp="1"/>
+          </p:cNvSpPr>
+          <p:nvPr>
+            <p:ph type="sldNum" sz="quarter" idx="12"/>
+          </p:nvPr>
+        </p:nvSpPr>
+        <p:spPr/>
+        <p:txBody>
+          <a:bodyPr/>
+          <a:lstStyle/>
+          <a:p>
+            <a:fld id="{8D2190A9-F7E3-4F14-B6E3-11E229756979}" type="slidenum">
+              <a:rPr lang="en-US" smtClean="0"/>
+              <a:t>6</a:t>
+            </a:fld>
+            <a:endParaRPr lang="en-US" dirty="0"/>
+          </a:p>
+        </p:txBody>
+      </p:sp>
+      <p:sp>
+        <p:nvSpPr>
+          <p:cNvPr id="4" name="Rectangle 3"/>
+          <p:cNvSpPr/>
+          <p:nvPr/>
+        </p:nvSpPr>
+        <p:spPr>
+          <a:xfrm>
+            <a:off x="613774" y="610644"/>
+            <a:ext cx="10964668" cy="4247317"/>
+          </a:xfrm>
+          <a:prstGeom prst="rect">
+            <a:avLst/>
+          </a:prstGeom>
+        </p:spPr>
+        <p:txBody>
+          <a:bodyPr wrap="square">
+            <a:spAutoFit/>
+          </a:bodyPr>
+          <a:lstStyle/>
+          <a:p>
+            <a:pPr marL="285750" indent="-285750" algn="just">
+              <a:buFont typeface="Arial" panose="020B0604020202020204" pitchFamily="34" charset="0"/>
+              <a:buChar char="•"/>
+            </a:pPr>
+            <a:r>
+              <a:rPr lang="en-US" dirty="0"/>
+              <a:t>DMA normal mode is a mode of operation for DMA (Direct Memory Access) controllers where the transfer of data from a peripheral device to memory or from memory to a peripheral device is performed in a single, continuous transfer. In this mode, the DMA controller acts as an intermediary between the peripheral device and memory, taking control of the bus and managing the transfer of data without the need for intervention from the processor.</a:t>
+            </a:r>
+          </a:p>
+          <a:p>
+            <a:pPr marL="285750" indent="-285750" algn="just">
+              <a:buFont typeface="Arial" panose="020B0604020202020204" pitchFamily="34" charset="0"/>
+              <a:buChar char="•"/>
+            </a:pPr>
+            <a:endParaRPr lang="en-US" dirty="0"/>
+          </a:p>
+          <a:p>
+            <a:pPr marL="285750" indent="-285750" algn="just">
+              <a:buFont typeface="Arial" panose="020B0604020202020204" pitchFamily="34" charset="0"/>
+              <a:buChar char="•"/>
+            </a:pPr>
+            <a:r>
+              <a:rPr lang="en-US" dirty="0"/>
+              <a:t>In DMA normal mode, the peripheral device generates a request signal to initiate the transfer, and the DMA controller grants access to the bus. The DMA controller then performs the transfer of data from the peripheral device to memory or from memory to the peripheral device, and upon completion, releases the bus. The transfer is performed in a single transaction, without the need for repeated handshaking between the peripheral device and the DMA controller.</a:t>
+            </a:r>
+          </a:p>
+          <a:p>
+            <a:pPr marL="285750" indent="-285750" algn="just">
+              <a:buFont typeface="Arial" panose="020B0604020202020204" pitchFamily="34" charset="0"/>
+              <a:buChar char="•"/>
+            </a:pPr>
+            <a:endParaRPr lang="en-US" dirty="0"/>
+          </a:p>
+          <a:p>
+            <a:pPr marL="285750" indent="-285750" algn="just">
+              <a:buFont typeface="Arial" panose="020B0604020202020204" pitchFamily="34" charset="0"/>
+              <a:buChar char="•"/>
+            </a:pPr>
+            <a:r>
+              <a:rPr lang="en-US" dirty="0"/>
+              <a:t>DMA normal mode is typically used for small data transfers or for transfers that occur infrequently. This mode provides a simple and efficient mechanism for transferring data between a peripheral device and memory, freeing up the processor to perform other tasks during the transfer.</a:t>
+            </a:r>
+          </a:p>
+        </p:txBody>
+      </p:sp>
+    </p:spTree>
+    <p:extLst>
+      <p:ext uri="{BB962C8B-B14F-4D97-AF65-F5344CB8AC3E}">
+        <p14:creationId xmlns:p14="http://schemas.microsoft.com/office/powerpoint/2010/main" val="3006741192"/>
+      </p:ext>
+    </p:extLst>
+  </p:cSld>
+  <p:clrMapOvr>
+    <a:masterClrMapping/>
+  </p:clrMapOvr>
+</p:sld>
+</file>
+
+<file path=ppt/slides/slide7.xml><?xml version="1.0" encoding="utf-8"?>
+<p:sld xmlns:a="http://schemas.openxmlformats.org/drawingml/2006/main" xmlns:r="http://schemas.openxmlformats.org/officeDocument/2006/relationships" xmlns:p="http://schemas.openxmlformats.org/presentationml/2006/main">
+  <p:cSld>
+    <p:spTree>
+      <p:nvGrpSpPr>
+        <p:cNvPr id="1" name=""/>
+        <p:cNvGrpSpPr/>
+        <p:nvPr/>
+      </p:nvGrpSpPr>
+      <p:grpSpPr>
+        <a:xfrm>
+          <a:off x="0" y="0"/>
+          <a:ext cx="0" cy="0"/>
+          <a:chOff x="0" y="0"/>
+          <a:chExt cx="0" cy="0"/>
+        </a:xfrm>
+      </p:grpSpPr>
+      <p:sp>
+        <p:nvSpPr>
+          <p:cNvPr id="2" name="Title 1"/>
+          <p:cNvSpPr>
+            <a:spLocks noGrp="1"/>
+          </p:cNvSpPr>
+          <p:nvPr>
+            <p:ph type="title"/>
+          </p:nvPr>
+        </p:nvSpPr>
+        <p:spPr/>
+        <p:txBody>
+          <a:bodyPr>
+            <a:normAutofit fontScale="90000"/>
+          </a:bodyPr>
+          <a:lstStyle/>
+          <a:p>
+            <a:r>
+              <a:rPr lang="en-US" dirty="0" smtClean="0"/>
+              <a:t>DMA linked list mode</a:t>
+            </a:r>
+            <a:endParaRPr lang="en-US" dirty="0"/>
+          </a:p>
+        </p:txBody>
+      </p:sp>
+      <p:sp>
+        <p:nvSpPr>
+          <p:cNvPr id="3" name="Slide Number Placeholder 2"/>
+          <p:cNvSpPr>
+            <a:spLocks noGrp="1"/>
+          </p:cNvSpPr>
+          <p:nvPr>
+            <p:ph type="sldNum" sz="quarter" idx="12"/>
+          </p:nvPr>
+        </p:nvSpPr>
+        <p:spPr/>
+        <p:txBody>
+          <a:bodyPr/>
+          <a:lstStyle/>
+          <a:p>
+            <a:fld id="{8D2190A9-F7E3-4F14-B6E3-11E229756979}" type="slidenum">
+              <a:rPr lang="en-US" smtClean="0"/>
+              <a:t>7</a:t>
+            </a:fld>
+            <a:endParaRPr lang="en-US" dirty="0"/>
+          </a:p>
+        </p:txBody>
+      </p:sp>
+      <p:sp>
+        <p:nvSpPr>
+          <p:cNvPr id="4" name="Rectangle 3"/>
+          <p:cNvSpPr/>
+          <p:nvPr/>
+        </p:nvSpPr>
+        <p:spPr>
+          <a:xfrm>
+            <a:off x="613775" y="457200"/>
+            <a:ext cx="10964667" cy="4247317"/>
+          </a:xfrm>
+          <a:prstGeom prst="rect">
+            <a:avLst/>
+          </a:prstGeom>
+        </p:spPr>
+        <p:txBody>
+          <a:bodyPr wrap="square">
+            <a:spAutoFit/>
+          </a:bodyPr>
+          <a:lstStyle/>
+          <a:p>
+            <a:pPr marL="285750" indent="-285750" algn="just">
+              <a:buFont typeface="Arial" panose="020B0604020202020204" pitchFamily="34" charset="0"/>
+              <a:buChar char="•"/>
+            </a:pPr>
+            <a:r>
+              <a:rPr lang="en-US" dirty="0"/>
+              <a:t>DMA linked list mode is a mode of operation for DMA (Direct Memory Access) controllers that allows for the transfer of multiple blocks of data in a chain-like manner, with each block linked to the next block. In this mode, the DMA controller acts as an intermediary between the peripheral device and memory, taking control of the bus and managing the transfer of data without the need for intervention from the processor.</a:t>
+            </a:r>
+          </a:p>
+          <a:p>
+            <a:pPr marL="285750" indent="-285750" algn="just">
+              <a:buFont typeface="Arial" panose="020B0604020202020204" pitchFamily="34" charset="0"/>
+              <a:buChar char="•"/>
+            </a:pPr>
+            <a:endParaRPr lang="en-US" dirty="0"/>
+          </a:p>
+          <a:p>
+            <a:pPr marL="285750" indent="-285750" algn="just">
+              <a:buFont typeface="Arial" panose="020B0604020202020204" pitchFamily="34" charset="0"/>
+              <a:buChar char="•"/>
+            </a:pPr>
+            <a:r>
+              <a:rPr lang="en-US" dirty="0"/>
+              <a:t>In DMA linked list mode, the data to be transferred is divided into blocks, and each block is described by a data structure stored in memory, called a "node". The nodes contain information about the source and destination addresses, the size of the transfer, and a pointer to the next node in the list. The DMA controller starts the transfer by fetching the first node in the list, performing the transfer described by the node, and then fetching the next node in the list, and so on, until all nodes have been processed.</a:t>
+            </a:r>
+          </a:p>
+          <a:p>
+            <a:pPr marL="285750" indent="-285750" algn="just">
+              <a:buFont typeface="Arial" panose="020B0604020202020204" pitchFamily="34" charset="0"/>
+              <a:buChar char="•"/>
+            </a:pPr>
+            <a:endParaRPr lang="en-US" dirty="0"/>
+          </a:p>
+          <a:p>
+            <a:pPr marL="285750" indent="-285750" algn="just">
+              <a:buFont typeface="Arial" panose="020B0604020202020204" pitchFamily="34" charset="0"/>
+              <a:buChar char="•"/>
+            </a:pPr>
+            <a:r>
+              <a:rPr lang="en-US" dirty="0"/>
+              <a:t>DMA linked list mode provides a flexible and efficient mechanism for transferring multiple blocks of data between a peripheral device and memory, freeing up the processor to perform other tasks during the transfer. This mode is particularly useful for applications where the data to be transferred is dynamic or where the data transfer patterns are complex and change frequently.</a:t>
+            </a:r>
+          </a:p>
+        </p:txBody>
+      </p:sp>
+    </p:spTree>
+    <p:extLst>
+      <p:ext uri="{BB962C8B-B14F-4D97-AF65-F5344CB8AC3E}">
+        <p14:creationId xmlns:p14="http://schemas.microsoft.com/office/powerpoint/2010/main" val="2560849918"/>
+      </p:ext>
+    </p:extLst>
+  </p:cSld>
+  <p:clrMapOvr>
+    <a:masterClrMapping/>
+  </p:clrMapOvr>
+</p:sld>
+</file>
+
+<file path=ppt/slides/slide8.xml><?xml version="1.0" encoding="utf-8"?>
+<p:sld xmlns:a="http://schemas.openxmlformats.org/drawingml/2006/main" xmlns:r="http://schemas.openxmlformats.org/officeDocument/2006/relationships" xmlns:p="http://schemas.openxmlformats.org/presentationml/2006/main">
+  <p:cSld>
+    <p:spTree>
+      <p:nvGrpSpPr>
+        <p:cNvPr id="1" name=""/>
+        <p:cNvGrpSpPr/>
+        <p:nvPr/>
+      </p:nvGrpSpPr>
+      <p:grpSpPr>
+        <a:xfrm>
+          <a:off x="0" y="0"/>
+          <a:ext cx="0" cy="0"/>
+          <a:chOff x="0" y="0"/>
+          <a:chExt cx="0" cy="0"/>
+        </a:xfrm>
+      </p:grpSpPr>
+      <p:sp>
+        <p:nvSpPr>
+          <p:cNvPr id="2" name="Title 1"/>
+          <p:cNvSpPr>
+            <a:spLocks noGrp="1"/>
+          </p:cNvSpPr>
+          <p:nvPr>
+            <p:ph type="title"/>
+          </p:nvPr>
+        </p:nvSpPr>
+        <p:spPr/>
+        <p:txBody>
+          <a:bodyPr>
+            <a:normAutofit fontScale="90000"/>
+          </a:bodyPr>
+          <a:lstStyle/>
+          <a:p>
+            <a:r>
+              <a:rPr lang="en-US" dirty="0" smtClean="0"/>
+              <a:t>DMA channel arbitration</a:t>
+            </a:r>
+            <a:endParaRPr lang="en-US" dirty="0"/>
+          </a:p>
+        </p:txBody>
+      </p:sp>
+      <p:sp>
+        <p:nvSpPr>
+          <p:cNvPr id="3" name="Slide Number Placeholder 2"/>
+          <p:cNvSpPr>
+            <a:spLocks noGrp="1"/>
+          </p:cNvSpPr>
+          <p:nvPr>
+            <p:ph type="sldNum" sz="quarter" idx="12"/>
+          </p:nvPr>
+        </p:nvSpPr>
+        <p:spPr/>
+        <p:txBody>
+          <a:bodyPr/>
+          <a:lstStyle/>
+          <a:p>
+            <a:fld id="{8D2190A9-F7E3-4F14-B6E3-11E229756979}" type="slidenum">
+              <a:rPr lang="en-US" smtClean="0"/>
+              <a:t>8</a:t>
+            </a:fld>
+            <a:endParaRPr lang="en-US" dirty="0"/>
+          </a:p>
+        </p:txBody>
+      </p:sp>
+      <p:sp>
+        <p:nvSpPr>
+          <p:cNvPr id="5" name="Rectangle 4"/>
+          <p:cNvSpPr/>
+          <p:nvPr/>
+        </p:nvSpPr>
+        <p:spPr>
+          <a:xfrm>
+            <a:off x="613666" y="457200"/>
+            <a:ext cx="10964667" cy="5755422"/>
+          </a:xfrm>
+          <a:prstGeom prst="rect">
+            <a:avLst/>
+          </a:prstGeom>
+        </p:spPr>
+        <p:txBody>
+          <a:bodyPr wrap="square">
+            <a:spAutoFit/>
+          </a:bodyPr>
+          <a:lstStyle/>
+          <a:p>
+            <a:pPr marL="171450" indent="-171450" algn="just">
+              <a:buFont typeface="Arial" panose="020B0604020202020204" pitchFamily="34" charset="0"/>
+              <a:buChar char="•"/>
+            </a:pPr>
+            <a:r>
+              <a:rPr lang="en-US" sz="1600" dirty="0"/>
+              <a:t>DMA channel arbitration refers to the process of determining which DMA channel will be given access to the bus to perform a data transfer. When multiple peripheral devices are requesting a transfer at the same time, the DMA controller must decide which request to process first</a:t>
+            </a:r>
+            <a:r>
+              <a:rPr lang="en-US" sz="1600" dirty="0" smtClean="0"/>
+              <a:t>.</a:t>
+            </a:r>
+            <a:endParaRPr lang="en-US" sz="1600" dirty="0"/>
+          </a:p>
+          <a:p>
+            <a:pPr marL="171450" indent="-171450" algn="just">
+              <a:buFont typeface="Arial" panose="020B0604020202020204" pitchFamily="34" charset="0"/>
+              <a:buChar char="•"/>
+            </a:pPr>
+            <a:r>
+              <a:rPr lang="en-US" sz="1600" dirty="0"/>
+              <a:t>There are several methods of DMA channel arbitration, including</a:t>
+            </a:r>
+            <a:r>
+              <a:rPr lang="en-US" sz="1600" dirty="0" smtClean="0"/>
+              <a:t>:</a:t>
+            </a:r>
+            <a:endParaRPr lang="en-US" sz="1600" dirty="0"/>
+          </a:p>
+          <a:p>
+            <a:pPr marL="628650" lvl="1" indent="-171450" algn="just">
+              <a:buFont typeface="Courier New" panose="02070309020205020404" pitchFamily="49" charset="0"/>
+              <a:buChar char="o"/>
+            </a:pPr>
+            <a:r>
+              <a:rPr lang="en-US" sz="1600" dirty="0"/>
+              <a:t>Fixed Priority: In this method, each DMA channel is assigned a priority, and the channel with the highest priority is granted access to the bus first</a:t>
+            </a:r>
+            <a:r>
+              <a:rPr lang="en-US" sz="1600" dirty="0" smtClean="0"/>
+              <a:t>.</a:t>
+            </a:r>
+            <a:endParaRPr lang="en-US" sz="1600" dirty="0"/>
+          </a:p>
+          <a:p>
+            <a:pPr marL="628650" lvl="1" indent="-171450" algn="just">
+              <a:buFont typeface="Courier New" panose="02070309020205020404" pitchFamily="49" charset="0"/>
+              <a:buChar char="o"/>
+            </a:pPr>
+            <a:r>
+              <a:rPr lang="en-US" sz="1600" dirty="0"/>
+              <a:t>Round Robin: In this method, the DMA controller cycles through all the DMA channels, granting each one access to the bus in turn</a:t>
+            </a:r>
+            <a:r>
+              <a:rPr lang="en-US" sz="1600" dirty="0" smtClean="0"/>
+              <a:t>.</a:t>
+            </a:r>
+            <a:endParaRPr lang="en-US" sz="1600" dirty="0"/>
+          </a:p>
+          <a:p>
+            <a:pPr marL="628650" lvl="1" indent="-171450" algn="just">
+              <a:buFont typeface="Courier New" panose="02070309020205020404" pitchFamily="49" charset="0"/>
+              <a:buChar char="o"/>
+            </a:pPr>
+            <a:r>
+              <a:rPr lang="en-US" sz="1600" dirty="0"/>
+              <a:t>Sporadic: In this method, the DMA controller assigns access to the bus based on the frequency of requests from each channel. Channels that request transfers more frequently are given higher priority</a:t>
+            </a:r>
+            <a:r>
+              <a:rPr lang="en-US" sz="1600" dirty="0" smtClean="0"/>
+              <a:t>.</a:t>
+            </a:r>
+            <a:endParaRPr lang="en-US" sz="1600" dirty="0"/>
+          </a:p>
+          <a:p>
+            <a:pPr marL="628650" lvl="1" indent="-171450" algn="just">
+              <a:buFont typeface="Courier New" panose="02070309020205020404" pitchFamily="49" charset="0"/>
+              <a:buChar char="o"/>
+            </a:pPr>
+            <a:r>
+              <a:rPr lang="en-US" sz="1600" dirty="0"/>
+              <a:t>Weighted Round Robin: In this method, the DMA controller grants access to the bus based on a combination of channel priority and the frequency of requests</a:t>
+            </a:r>
+            <a:r>
+              <a:rPr lang="en-US" sz="1600" dirty="0" smtClean="0"/>
+              <a:t>.</a:t>
+            </a:r>
+            <a:endParaRPr lang="en-US" sz="1600" dirty="0"/>
+          </a:p>
+          <a:p>
+            <a:pPr marL="171450" indent="-171450" algn="just">
+              <a:buFont typeface="Arial" panose="020B0604020202020204" pitchFamily="34" charset="0"/>
+              <a:buChar char="•"/>
+            </a:pPr>
+            <a:r>
+              <a:rPr lang="en-US" sz="1600" dirty="0"/>
+              <a:t>The specific method used for DMA channel arbitration depends on the requirements of the system and the specific implementation of the DMA controller</a:t>
+            </a:r>
+            <a:r>
+              <a:rPr lang="en-US" sz="1600" dirty="0" smtClean="0"/>
+              <a:t>.</a:t>
+            </a:r>
+            <a:endParaRPr lang="en-US" sz="1600" dirty="0"/>
+          </a:p>
+          <a:p>
+            <a:pPr marL="171450" indent="-171450" algn="just">
+              <a:buFont typeface="Arial" panose="020B0604020202020204" pitchFamily="34" charset="0"/>
+              <a:buChar char="•"/>
+            </a:pPr>
+            <a:r>
+              <a:rPr lang="en-US" sz="1600" dirty="0"/>
+              <a:t>The choice of the best method for DMA channel arbitration in a system with 32 channels would depend on the specific requirements of the system and the data transfer patterns of the peripherals. However, if all the channels have roughly equal priority, the Round Robin method can be a good choice, as it provides a fair and balanced allocation of bus access to all the channels. This method can also help to avoid starvation of any individual channel if there are irregular bursts of requests</a:t>
+            </a:r>
+            <a:r>
+              <a:rPr lang="en-US" sz="1600" dirty="0" smtClean="0"/>
+              <a:t>.</a:t>
+            </a:r>
+            <a:endParaRPr lang="en-US" sz="1600" dirty="0"/>
+          </a:p>
+          <a:p>
+            <a:pPr marL="171450" indent="-171450" algn="just">
+              <a:buFont typeface="Arial" panose="020B0604020202020204" pitchFamily="34" charset="0"/>
+              <a:buChar char="•"/>
+            </a:pPr>
+            <a:r>
+              <a:rPr lang="en-US" sz="1600" dirty="0"/>
+              <a:t>If some channels have a higher priority, then a combination of Fixed Priority and Weighted Round Robin methods can be used, where the higher priority channels are granted bus access first and the remaining channels are granted access based on a weighted round-robin algorithm</a:t>
+            </a:r>
+            <a:r>
+              <a:rPr lang="en-US" sz="1600" dirty="0" smtClean="0"/>
+              <a:t>.</a:t>
+            </a:r>
+            <a:endParaRPr lang="en-US" sz="1600" dirty="0"/>
+          </a:p>
+          <a:p>
+            <a:pPr marL="171450" indent="-171450" algn="just">
+              <a:buFont typeface="Arial" panose="020B0604020202020204" pitchFamily="34" charset="0"/>
+              <a:buChar char="•"/>
+            </a:pPr>
+            <a:r>
+              <a:rPr lang="en-US" sz="1600" dirty="0"/>
+              <a:t>Ultimately, the best method for DMA channel arbitration would need to be evaluated and determined based on a detailed analysis of the system requirements and the performance characteristics of the DMA controller.</a:t>
+            </a:r>
+          </a:p>
+        </p:txBody>
+      </p:sp>
+    </p:spTree>
+    <p:extLst>
+      <p:ext uri="{BB962C8B-B14F-4D97-AF65-F5344CB8AC3E}">
+        <p14:creationId xmlns:p14="http://schemas.microsoft.com/office/powerpoint/2010/main" val="427337786"/>
       </p:ext>
     </p:extLst>
   </p:cSld>

</xml_diff>

<commit_message>
add channel disabling without data loss, channel locking, hold function, status indication outputs
</commit_message>
<xml_diff>
--- a/theory/dma_controller.pptx
+++ b/theory/dma_controller.pptx
@@ -5,7 +5,7 @@
     <p:sldMasterId id="2147483648" r:id="rId1"/>
   </p:sldMasterIdLst>
   <p:notesMasterIdLst>
-    <p:notesMasterId r:id="rId10"/>
+    <p:notesMasterId r:id="rId14"/>
   </p:notesMasterIdLst>
   <p:sldIdLst>
     <p:sldId id="256" r:id="rId2"/>
@@ -16,6 +16,10 @@
     <p:sldId id="261" r:id="rId7"/>
     <p:sldId id="262" r:id="rId8"/>
     <p:sldId id="263" r:id="rId9"/>
+    <p:sldId id="264" r:id="rId10"/>
+    <p:sldId id="265" r:id="rId11"/>
+    <p:sldId id="266" r:id="rId12"/>
+    <p:sldId id="267" r:id="rId13"/>
   </p:sldIdLst>
   <p:sldSz cx="12192000" cy="6858000"/>
   <p:notesSz cx="6858000" cy="9144000"/>
@@ -215,7 +219,7 @@
           <a:p>
             <a:fld id="{58532C1C-6881-4E29-9FBE-3ED9764DF568}" type="datetimeFigureOut">
               <a:rPr lang="en-US" smtClean="0"/>
-              <a:t>2/7/2023</a:t>
+              <a:t>2/9/2023</a:t>
             </a:fld>
             <a:endParaRPr lang="en-US"/>
           </a:p>
@@ -3400,6 +3404,482 @@
 </p:sld>
 </file>
 
+<file path=ppt/slides/slide10.xml><?xml version="1.0" encoding="utf-8"?>
+<p:sld xmlns:a="http://schemas.openxmlformats.org/drawingml/2006/main" xmlns:r="http://schemas.openxmlformats.org/officeDocument/2006/relationships" xmlns:p="http://schemas.openxmlformats.org/presentationml/2006/main">
+  <p:cSld>
+    <p:spTree>
+      <p:nvGrpSpPr>
+        <p:cNvPr id="1" name=""/>
+        <p:cNvGrpSpPr/>
+        <p:nvPr/>
+      </p:nvGrpSpPr>
+      <p:grpSpPr>
+        <a:xfrm>
+          <a:off x="0" y="0"/>
+          <a:ext cx="0" cy="0"/>
+          <a:chOff x="0" y="0"/>
+          <a:chExt cx="0" cy="0"/>
+        </a:xfrm>
+      </p:grpSpPr>
+      <p:sp>
+        <p:nvSpPr>
+          <p:cNvPr id="2" name="Title 1"/>
+          <p:cNvSpPr>
+            <a:spLocks noGrp="1"/>
+          </p:cNvSpPr>
+          <p:nvPr>
+            <p:ph type="title"/>
+          </p:nvPr>
+        </p:nvSpPr>
+        <p:spPr/>
+        <p:txBody>
+          <a:bodyPr>
+            <a:normAutofit fontScale="90000"/>
+          </a:bodyPr>
+          <a:lstStyle/>
+          <a:p>
+            <a:r>
+              <a:rPr lang="en-US" dirty="0" smtClean="0"/>
+              <a:t>DMA channel disabling without data loss</a:t>
+            </a:r>
+            <a:endParaRPr lang="en-US" dirty="0"/>
+          </a:p>
+        </p:txBody>
+      </p:sp>
+      <p:sp>
+        <p:nvSpPr>
+          <p:cNvPr id="3" name="Slide Number Placeholder 2"/>
+          <p:cNvSpPr>
+            <a:spLocks noGrp="1"/>
+          </p:cNvSpPr>
+          <p:nvPr>
+            <p:ph type="sldNum" sz="quarter" idx="12"/>
+          </p:nvPr>
+        </p:nvSpPr>
+        <p:spPr/>
+        <p:txBody>
+          <a:bodyPr/>
+          <a:lstStyle/>
+          <a:p>
+            <a:fld id="{8D2190A9-F7E3-4F14-B6E3-11E229756979}" type="slidenum">
+              <a:rPr lang="en-US" smtClean="0"/>
+              <a:t>10</a:t>
+            </a:fld>
+            <a:endParaRPr lang="en-US" dirty="0"/>
+          </a:p>
+        </p:txBody>
+      </p:sp>
+      <p:sp>
+        <p:nvSpPr>
+          <p:cNvPr id="4" name="Rectangle 3"/>
+          <p:cNvSpPr/>
+          <p:nvPr/>
+        </p:nvSpPr>
+        <p:spPr>
+          <a:xfrm>
+            <a:off x="607512" y="612845"/>
+            <a:ext cx="10970930" cy="3693319"/>
+          </a:xfrm>
+          <a:prstGeom prst="rect">
+            <a:avLst/>
+          </a:prstGeom>
+        </p:spPr>
+        <p:txBody>
+          <a:bodyPr wrap="square">
+            <a:spAutoFit/>
+          </a:bodyPr>
+          <a:lstStyle/>
+          <a:p>
+            <a:pPr marL="285750" indent="-285750" algn="just">
+              <a:buFont typeface="Arial" panose="020B0604020202020204" pitchFamily="34" charset="0"/>
+              <a:buChar char="•"/>
+            </a:pPr>
+            <a:r>
+              <a:rPr lang="en-US" dirty="0"/>
+              <a:t>DMA channel disabling without data loss refers to the process of disabling a DMA </a:t>
+            </a:r>
+            <a:r>
+              <a:rPr lang="en-US" dirty="0" smtClean="0"/>
+              <a:t>channel </a:t>
+            </a:r>
+            <a:r>
+              <a:rPr lang="en-US" dirty="0"/>
+              <a:t>while preserving the data that is being transferred. In a DMA transfer, data is moved from a peripheral device to memory or from memory to a peripheral device without the intervention of the processor. If the DMA channel is disabled while the transfer is in progress, it could result in loss of data.</a:t>
+            </a:r>
+          </a:p>
+          <a:p>
+            <a:pPr marL="285750" indent="-285750" algn="just">
+              <a:buFont typeface="Arial" panose="020B0604020202020204" pitchFamily="34" charset="0"/>
+              <a:buChar char="•"/>
+            </a:pPr>
+            <a:endParaRPr lang="en-US" dirty="0"/>
+          </a:p>
+          <a:p>
+            <a:pPr marL="285750" indent="-285750" algn="just">
+              <a:buFont typeface="Arial" panose="020B0604020202020204" pitchFamily="34" charset="0"/>
+              <a:buChar char="•"/>
+            </a:pPr>
+            <a:r>
+              <a:rPr lang="en-US" dirty="0"/>
+              <a:t>To prevent data loss during the disabling of a DMA channel, the DMA controller typically provides a mechanism to pause the transfer, allowing the channel to be disabled without losing any data. Once the channel has been disabled, the transfer can be resumed from the point where it was paused. This mechanism helps to ensure that the transfer of data is performed in a consistent and reliable manner, even if the channel must be disabled during the transfer.</a:t>
+            </a:r>
+          </a:p>
+          <a:p>
+            <a:pPr marL="285750" indent="-285750" algn="just">
+              <a:buFont typeface="Arial" panose="020B0604020202020204" pitchFamily="34" charset="0"/>
+              <a:buChar char="•"/>
+            </a:pPr>
+            <a:endParaRPr lang="en-US" dirty="0"/>
+          </a:p>
+          <a:p>
+            <a:pPr marL="285750" indent="-285750" algn="just">
+              <a:buFont typeface="Arial" panose="020B0604020202020204" pitchFamily="34" charset="0"/>
+              <a:buChar char="•"/>
+            </a:pPr>
+            <a:r>
+              <a:rPr lang="en-US" dirty="0"/>
+              <a:t>It's important to note that the mechanism for disabling a DMA channel without data loss may vary depending on the specific DMA controller and system architecture.</a:t>
+            </a:r>
+          </a:p>
+        </p:txBody>
+      </p:sp>
+    </p:spTree>
+    <p:extLst>
+      <p:ext uri="{BB962C8B-B14F-4D97-AF65-F5344CB8AC3E}">
+        <p14:creationId xmlns:p14="http://schemas.microsoft.com/office/powerpoint/2010/main" val="1072982698"/>
+      </p:ext>
+    </p:extLst>
+  </p:cSld>
+  <p:clrMapOvr>
+    <a:masterClrMapping/>
+  </p:clrMapOvr>
+</p:sld>
+</file>
+
+<file path=ppt/slides/slide11.xml><?xml version="1.0" encoding="utf-8"?>
+<p:sld xmlns:a="http://schemas.openxmlformats.org/drawingml/2006/main" xmlns:r="http://schemas.openxmlformats.org/officeDocument/2006/relationships" xmlns:p="http://schemas.openxmlformats.org/presentationml/2006/main">
+  <p:cSld>
+    <p:spTree>
+      <p:nvGrpSpPr>
+        <p:cNvPr id="1" name=""/>
+        <p:cNvGrpSpPr/>
+        <p:nvPr/>
+      </p:nvGrpSpPr>
+      <p:grpSpPr>
+        <a:xfrm>
+          <a:off x="0" y="0"/>
+          <a:ext cx="0" cy="0"/>
+          <a:chOff x="0" y="0"/>
+          <a:chExt cx="0" cy="0"/>
+        </a:xfrm>
+      </p:grpSpPr>
+      <p:sp>
+        <p:nvSpPr>
+          <p:cNvPr id="2" name="Title 1"/>
+          <p:cNvSpPr>
+            <a:spLocks noGrp="1"/>
+          </p:cNvSpPr>
+          <p:nvPr>
+            <p:ph type="title"/>
+          </p:nvPr>
+        </p:nvSpPr>
+        <p:spPr/>
+        <p:txBody>
+          <a:bodyPr>
+            <a:normAutofit fontScale="90000"/>
+          </a:bodyPr>
+          <a:lstStyle/>
+          <a:p>
+            <a:r>
+              <a:rPr lang="en-US" dirty="0" smtClean="0"/>
+              <a:t>DMA hold function</a:t>
+            </a:r>
+            <a:endParaRPr lang="en-US" dirty="0"/>
+          </a:p>
+        </p:txBody>
+      </p:sp>
+      <p:sp>
+        <p:nvSpPr>
+          <p:cNvPr id="3" name="Slide Number Placeholder 2"/>
+          <p:cNvSpPr>
+            <a:spLocks noGrp="1"/>
+          </p:cNvSpPr>
+          <p:nvPr>
+            <p:ph type="sldNum" sz="quarter" idx="12"/>
+          </p:nvPr>
+        </p:nvSpPr>
+        <p:spPr/>
+        <p:txBody>
+          <a:bodyPr/>
+          <a:lstStyle/>
+          <a:p>
+            <a:fld id="{8D2190A9-F7E3-4F14-B6E3-11E229756979}" type="slidenum">
+              <a:rPr lang="en-US" smtClean="0"/>
+              <a:t>11</a:t>
+            </a:fld>
+            <a:endParaRPr lang="en-US" dirty="0"/>
+          </a:p>
+        </p:txBody>
+      </p:sp>
+      <p:sp>
+        <p:nvSpPr>
+          <p:cNvPr id="4" name="Rectangle 3"/>
+          <p:cNvSpPr/>
+          <p:nvPr/>
+        </p:nvSpPr>
+        <p:spPr>
+          <a:xfrm>
+            <a:off x="613775" y="504947"/>
+            <a:ext cx="10964667" cy="3693319"/>
+          </a:xfrm>
+          <a:prstGeom prst="rect">
+            <a:avLst/>
+          </a:prstGeom>
+        </p:spPr>
+        <p:txBody>
+          <a:bodyPr wrap="square">
+            <a:spAutoFit/>
+          </a:bodyPr>
+          <a:lstStyle/>
+          <a:p>
+            <a:pPr marL="285750" indent="-285750" algn="just">
+              <a:buFont typeface="Arial" panose="020B0604020202020204" pitchFamily="34" charset="0"/>
+              <a:buChar char="•"/>
+            </a:pPr>
+            <a:r>
+              <a:rPr lang="en-US" dirty="0"/>
+              <a:t>DMA hold function allows the transfer of data to be temporarily suspended while the processor performs other tasks. The DMA hold function allows the processor to temporarily stop the DMA transfer, and then resume the transfer later, at the same place where it was stopped.</a:t>
+            </a:r>
+          </a:p>
+          <a:p>
+            <a:pPr marL="285750" indent="-285750" algn="just">
+              <a:buFont typeface="Arial" panose="020B0604020202020204" pitchFamily="34" charset="0"/>
+              <a:buChar char="•"/>
+            </a:pPr>
+            <a:endParaRPr lang="en-US" dirty="0"/>
+          </a:p>
+          <a:p>
+            <a:pPr marL="285750" indent="-285750" algn="just">
+              <a:buFont typeface="Arial" panose="020B0604020202020204" pitchFamily="34" charset="0"/>
+              <a:buChar char="•"/>
+            </a:pPr>
+            <a:r>
+              <a:rPr lang="en-US" dirty="0"/>
+              <a:t>The DMA hold function is implemented by adding a "hold" signal to the DMA controller, which is controlled by the processor. When the processor wants to temporarily stop the DMA transfer, it asserts the hold signal. The DMA controller then pauses the transfer and waits for the processor to release the hold signal. When the hold signal is released, the DMA controller resumes the transfer from the point where it was stopped.</a:t>
+            </a:r>
+          </a:p>
+          <a:p>
+            <a:pPr marL="285750" indent="-285750" algn="just">
+              <a:buFont typeface="Arial" panose="020B0604020202020204" pitchFamily="34" charset="0"/>
+              <a:buChar char="•"/>
+            </a:pPr>
+            <a:endParaRPr lang="en-US" dirty="0"/>
+          </a:p>
+          <a:p>
+            <a:pPr marL="285750" indent="-285750" algn="just">
+              <a:buFont typeface="Arial" panose="020B0604020202020204" pitchFamily="34" charset="0"/>
+              <a:buChar char="•"/>
+            </a:pPr>
+            <a:r>
+              <a:rPr lang="en-US" dirty="0"/>
+              <a:t>The DMA hold function provides a mechanism for ensuring that the processor has control over the DMA transfer, and it provides a mechanism for temporarily stopping the transfer when the processor needs to perform other tasks. This feature is particularly useful for applications where the processor needs to perform complex tasks or needs to temporarily halt the transfer in order to perform other functions.</a:t>
+            </a:r>
+          </a:p>
+        </p:txBody>
+      </p:sp>
+    </p:spTree>
+    <p:extLst>
+      <p:ext uri="{BB962C8B-B14F-4D97-AF65-F5344CB8AC3E}">
+        <p14:creationId xmlns:p14="http://schemas.microsoft.com/office/powerpoint/2010/main" val="2709493088"/>
+      </p:ext>
+    </p:extLst>
+  </p:cSld>
+  <p:clrMapOvr>
+    <a:masterClrMapping/>
+  </p:clrMapOvr>
+</p:sld>
+</file>
+
+<file path=ppt/slides/slide12.xml><?xml version="1.0" encoding="utf-8"?>
+<p:sld xmlns:a="http://schemas.openxmlformats.org/drawingml/2006/main" xmlns:r="http://schemas.openxmlformats.org/officeDocument/2006/relationships" xmlns:p="http://schemas.openxmlformats.org/presentationml/2006/main">
+  <p:cSld>
+    <p:spTree>
+      <p:nvGrpSpPr>
+        <p:cNvPr id="1" name=""/>
+        <p:cNvGrpSpPr/>
+        <p:nvPr/>
+      </p:nvGrpSpPr>
+      <p:grpSpPr>
+        <a:xfrm>
+          <a:off x="0" y="0"/>
+          <a:ext cx="0" cy="0"/>
+          <a:chOff x="0" y="0"/>
+          <a:chExt cx="0" cy="0"/>
+        </a:xfrm>
+      </p:grpSpPr>
+      <p:sp>
+        <p:nvSpPr>
+          <p:cNvPr id="2" name="Title 1"/>
+          <p:cNvSpPr>
+            <a:spLocks noGrp="1"/>
+          </p:cNvSpPr>
+          <p:nvPr>
+            <p:ph type="title"/>
+          </p:nvPr>
+        </p:nvSpPr>
+        <p:spPr/>
+        <p:txBody>
+          <a:bodyPr>
+            <a:normAutofit fontScale="90000"/>
+          </a:bodyPr>
+          <a:lstStyle/>
+          <a:p>
+            <a:r>
+              <a:rPr lang="en-US" dirty="0" smtClean="0"/>
+              <a:t>DMAC status indication outputs</a:t>
+            </a:r>
+            <a:endParaRPr lang="en-US" dirty="0"/>
+          </a:p>
+        </p:txBody>
+      </p:sp>
+      <p:sp>
+        <p:nvSpPr>
+          <p:cNvPr id="3" name="Slide Number Placeholder 2"/>
+          <p:cNvSpPr>
+            <a:spLocks noGrp="1"/>
+          </p:cNvSpPr>
+          <p:nvPr>
+            <p:ph type="sldNum" sz="quarter" idx="12"/>
+          </p:nvPr>
+        </p:nvSpPr>
+        <p:spPr/>
+        <p:txBody>
+          <a:bodyPr/>
+          <a:lstStyle/>
+          <a:p>
+            <a:fld id="{8D2190A9-F7E3-4F14-B6E3-11E229756979}" type="slidenum">
+              <a:rPr lang="en-US" smtClean="0"/>
+              <a:t>12</a:t>
+            </a:fld>
+            <a:endParaRPr lang="en-US" dirty="0"/>
+          </a:p>
+        </p:txBody>
+      </p:sp>
+      <p:sp>
+        <p:nvSpPr>
+          <p:cNvPr id="4" name="Rectangle 3"/>
+          <p:cNvSpPr/>
+          <p:nvPr/>
+        </p:nvSpPr>
+        <p:spPr>
+          <a:xfrm>
+            <a:off x="616798" y="457200"/>
+            <a:ext cx="10958404" cy="3693319"/>
+          </a:xfrm>
+          <a:prstGeom prst="rect">
+            <a:avLst/>
+          </a:prstGeom>
+        </p:spPr>
+        <p:txBody>
+          <a:bodyPr wrap="square">
+            <a:spAutoFit/>
+          </a:bodyPr>
+          <a:lstStyle/>
+          <a:p>
+            <a:pPr marL="285750" indent="-285750" algn="just">
+              <a:buFont typeface="Arial" panose="020B0604020202020204" pitchFamily="34" charset="0"/>
+              <a:buChar char="•"/>
+            </a:pPr>
+            <a:r>
+              <a:rPr lang="en-US" dirty="0"/>
+              <a:t>DMA (Direct Memory Access) controller status indication outputs are signals generated by the DMA controller that indicate the status of a DMA transfer. These signals provide information about the state of the transfer, such as whether the transfer is in progress, whether it has completed, or whether an error has occurred</a:t>
+            </a:r>
+            <a:r>
+              <a:rPr lang="en-US" dirty="0" smtClean="0"/>
+              <a:t>.</a:t>
+            </a:r>
+            <a:endParaRPr lang="en-US" dirty="0"/>
+          </a:p>
+          <a:p>
+            <a:pPr marL="285750" indent="-285750" algn="just">
+              <a:buFont typeface="Arial" panose="020B0604020202020204" pitchFamily="34" charset="0"/>
+              <a:buChar char="•"/>
+            </a:pPr>
+            <a:r>
+              <a:rPr lang="en-US" dirty="0"/>
+              <a:t>The specific status indication outputs provided by a DMA controller can vary depending on the specific controller and system architecture, but common status outputs include</a:t>
+            </a:r>
+            <a:r>
+              <a:rPr lang="en-US" dirty="0" smtClean="0"/>
+              <a:t>:</a:t>
+            </a:r>
+            <a:endParaRPr lang="en-US" dirty="0"/>
+          </a:p>
+          <a:p>
+            <a:pPr marL="742950" lvl="1" indent="-285750" algn="just">
+              <a:buFont typeface="Courier New" panose="02070309020205020404" pitchFamily="49" charset="0"/>
+              <a:buChar char="o"/>
+            </a:pPr>
+            <a:r>
+              <a:rPr lang="en-US" dirty="0"/>
+              <a:t>Transfer Complete: A signal that indicates when a DMA transfer has completed successfully.</a:t>
+            </a:r>
+          </a:p>
+          <a:p>
+            <a:pPr marL="742950" lvl="1" indent="-285750" algn="just">
+              <a:buFont typeface="Courier New" panose="02070309020205020404" pitchFamily="49" charset="0"/>
+              <a:buChar char="o"/>
+            </a:pPr>
+            <a:r>
+              <a:rPr lang="en-US" dirty="0"/>
+              <a:t>Error: A signal that indicates that an error has occurred during the transfer.</a:t>
+            </a:r>
+          </a:p>
+          <a:p>
+            <a:pPr marL="742950" lvl="1" indent="-285750" algn="just">
+              <a:buFont typeface="Courier New" panose="02070309020205020404" pitchFamily="49" charset="0"/>
+              <a:buChar char="o"/>
+            </a:pPr>
+            <a:r>
+              <a:rPr lang="en-US" dirty="0"/>
+              <a:t>Busy: A signal that indicates that the DMA controller is currently transferring data.</a:t>
+            </a:r>
+          </a:p>
+          <a:p>
+            <a:pPr marL="742950" lvl="1" indent="-285750" algn="just">
+              <a:buFont typeface="Courier New" panose="02070309020205020404" pitchFamily="49" charset="0"/>
+              <a:buChar char="o"/>
+            </a:pPr>
+            <a:r>
+              <a:rPr lang="en-US" dirty="0"/>
+              <a:t>Transfer Request: A signal that indicates that a DMA transfer has been requested by a peripheral device.</a:t>
+            </a:r>
+          </a:p>
+          <a:p>
+            <a:pPr marL="285750" indent="-285750" algn="just">
+              <a:buFont typeface="Arial" panose="020B0604020202020204" pitchFamily="34" charset="0"/>
+              <a:buChar char="•"/>
+            </a:pPr>
+            <a:r>
+              <a:rPr lang="en-US" dirty="0"/>
+              <a:t>The status indication outputs are used by the processor and other components in the system to monitor the status of the DMA transfer and to control the flow of data. For example, the processor may use the transfer complete signal to determine when a DMA transfer has finished, and then perform other tasks, or the processor may use the error signal to handle any errors that occur during the transfer.</a:t>
+            </a:r>
+          </a:p>
+        </p:txBody>
+      </p:sp>
+    </p:spTree>
+    <p:extLst>
+      <p:ext uri="{BB962C8B-B14F-4D97-AF65-F5344CB8AC3E}">
+        <p14:creationId xmlns:p14="http://schemas.microsoft.com/office/powerpoint/2010/main" val="803981711"/>
+      </p:ext>
+    </p:extLst>
+  </p:cSld>
+  <p:clrMapOvr>
+    <a:masterClrMapping/>
+  </p:clrMapOvr>
+</p:sld>
+</file>
+
 <file path=ppt/slides/slide2.xml><?xml version="1.0" encoding="utf-8"?>
 <p:sld xmlns:a="http://schemas.openxmlformats.org/drawingml/2006/main" xmlns:r="http://schemas.openxmlformats.org/officeDocument/2006/relationships" xmlns:p="http://schemas.openxmlformats.org/presentationml/2006/main">
   <p:cSld>
@@ -7371,7 +7851,15 @@
             </a:pPr>
             <a:r>
               <a:rPr lang="en-US" dirty="0"/>
-              <a:t>DMA handshake mode is a mechanism used in DMA (Direct Memory Access) transfers to coordinate the transfer of data between the peripheral device and the memory. It involves the exchange of control signals between the DMA controller and the peripheral device to initiate and control the transfer of data.</a:t>
+              <a:t>DMA handshake mode </a:t>
+            </a:r>
+            <a:r>
+              <a:rPr lang="en-US" dirty="0" smtClean="0"/>
+              <a:t>transfers </a:t>
+            </a:r>
+            <a:r>
+              <a:rPr lang="en-US" dirty="0"/>
+              <a:t>to coordinate the transfer of data between the peripheral device and the memory. It involves the exchange of control signals between the DMA controller and the peripheral device to initiate and control the transfer of data.</a:t>
             </a:r>
           </a:p>
           <a:p>
@@ -7497,7 +7985,7 @@
         <p:spPr>
           <a:xfrm>
             <a:off x="613774" y="610644"/>
-            <a:ext cx="10964668" cy="4247317"/>
+            <a:ext cx="10964668" cy="3970318"/>
           </a:xfrm>
           <a:prstGeom prst="rect">
             <a:avLst/>
@@ -7515,7 +8003,15 @@
             </a:pPr>
             <a:r>
               <a:rPr lang="en-US" dirty="0"/>
-              <a:t>DMA normal mode is a mode of operation for DMA (Direct Memory Access) controllers where the transfer of data from a peripheral device to memory or from memory to a peripheral device is performed in a single, continuous transfer. In this mode, the DMA controller acts as an intermediary between the peripheral device and memory, taking control of the bus and managing the transfer of data without the need for intervention from the processor.</a:t>
+              <a:t>DMA normal mode </a:t>
+            </a:r>
+            <a:r>
+              <a:rPr lang="en-US" dirty="0" smtClean="0"/>
+              <a:t>is a mode where the transfers data </a:t>
+            </a:r>
+            <a:r>
+              <a:rPr lang="en-US" dirty="0"/>
+              <a:t>from a peripheral device to memory or from memory to a peripheral device is performed in a single, continuous transfer. In this mode, the DMA controller acts as an intermediary between the peripheral device and memory, taking control of the bus and managing the transfer of data without the need for intervention from the processor.</a:t>
             </a:r>
           </a:p>
           <a:p>
@@ -7659,7 +8155,15 @@
             </a:pPr>
             <a:r>
               <a:rPr lang="en-US" dirty="0"/>
-              <a:t>DMA linked list mode is a mode of operation for DMA (Direct Memory Access) controllers that allows for the transfer of multiple blocks of data in a chain-like manner, with each block linked to the next block. In this mode, the DMA controller acts as an intermediary between the peripheral device and memory, taking control of the bus and managing the transfer of data without the need for intervention from the processor.</a:t>
+              <a:t>DMA linked list mode </a:t>
+            </a:r>
+            <a:r>
+              <a:rPr lang="en-US" dirty="0" smtClean="0"/>
+              <a:t>allows </a:t>
+            </a:r>
+            <a:r>
+              <a:rPr lang="en-US" dirty="0"/>
+              <a:t>for the transfer of multiple blocks of data in a chain-like manner, with each block linked to the next block. In this mode, the DMA controller acts as an intermediary between the peripheral device and memory, taking control of the bus and managing the transfer of data without the need for intervention from the processor.</a:t>
             </a:r>
           </a:p>
           <a:p>
@@ -7947,6 +8451,175 @@
     <p:extLst>
       <p:ext uri="{BB962C8B-B14F-4D97-AF65-F5344CB8AC3E}">
         <p14:creationId xmlns:p14="http://schemas.microsoft.com/office/powerpoint/2010/main" val="427337786"/>
+      </p:ext>
+    </p:extLst>
+  </p:cSld>
+  <p:clrMapOvr>
+    <a:masterClrMapping/>
+  </p:clrMapOvr>
+</p:sld>
+</file>
+
+<file path=ppt/slides/slide9.xml><?xml version="1.0" encoding="utf-8"?>
+<p:sld xmlns:a="http://schemas.openxmlformats.org/drawingml/2006/main" xmlns:r="http://schemas.openxmlformats.org/officeDocument/2006/relationships" xmlns:p="http://schemas.openxmlformats.org/presentationml/2006/main">
+  <p:cSld>
+    <p:spTree>
+      <p:nvGrpSpPr>
+        <p:cNvPr id="1" name=""/>
+        <p:cNvGrpSpPr/>
+        <p:nvPr/>
+      </p:nvGrpSpPr>
+      <p:grpSpPr>
+        <a:xfrm>
+          <a:off x="0" y="0"/>
+          <a:ext cx="0" cy="0"/>
+          <a:chOff x="0" y="0"/>
+          <a:chExt cx="0" cy="0"/>
+        </a:xfrm>
+      </p:grpSpPr>
+      <p:sp>
+        <p:nvSpPr>
+          <p:cNvPr id="2" name="Title 1"/>
+          <p:cNvSpPr>
+            <a:spLocks noGrp="1"/>
+          </p:cNvSpPr>
+          <p:nvPr>
+            <p:ph type="title"/>
+          </p:nvPr>
+        </p:nvSpPr>
+        <p:spPr/>
+        <p:txBody>
+          <a:bodyPr>
+            <a:normAutofit fontScale="90000"/>
+          </a:bodyPr>
+          <a:lstStyle/>
+          <a:p>
+            <a:r>
+              <a:rPr lang="en-US" dirty="0" smtClean="0"/>
+              <a:t>DMA channel locking</a:t>
+            </a:r>
+            <a:endParaRPr lang="en-US" dirty="0"/>
+          </a:p>
+        </p:txBody>
+      </p:sp>
+      <p:sp>
+        <p:nvSpPr>
+          <p:cNvPr id="3" name="Slide Number Placeholder 2"/>
+          <p:cNvSpPr>
+            <a:spLocks noGrp="1"/>
+          </p:cNvSpPr>
+          <p:nvPr>
+            <p:ph type="sldNum" sz="quarter" idx="12"/>
+          </p:nvPr>
+        </p:nvSpPr>
+        <p:spPr/>
+        <p:txBody>
+          <a:bodyPr/>
+          <a:lstStyle/>
+          <a:p>
+            <a:fld id="{8D2190A9-F7E3-4F14-B6E3-11E229756979}" type="slidenum">
+              <a:rPr lang="en-US" smtClean="0"/>
+              <a:t>9</a:t>
+            </a:fld>
+            <a:endParaRPr lang="en-US" dirty="0"/>
+          </a:p>
+        </p:txBody>
+      </p:sp>
+      <p:sp>
+        <p:nvSpPr>
+          <p:cNvPr id="4" name="Rectangle 3"/>
+          <p:cNvSpPr/>
+          <p:nvPr/>
+        </p:nvSpPr>
+        <p:spPr>
+          <a:xfrm>
+            <a:off x="620038" y="483306"/>
+            <a:ext cx="10958404" cy="4524315"/>
+          </a:xfrm>
+          <a:prstGeom prst="rect">
+            <a:avLst/>
+          </a:prstGeom>
+        </p:spPr>
+        <p:txBody>
+          <a:bodyPr wrap="square">
+            <a:spAutoFit/>
+          </a:bodyPr>
+          <a:lstStyle/>
+          <a:p>
+            <a:pPr marL="285750" indent="-285750" algn="just">
+              <a:buFont typeface="Arial" panose="020B0604020202020204" pitchFamily="34" charset="0"/>
+              <a:buChar char="•"/>
+            </a:pPr>
+            <a:r>
+              <a:rPr lang="en-US" dirty="0"/>
+              <a:t>DMA channel locking </a:t>
+            </a:r>
+            <a:r>
+              <a:rPr lang="en-US" dirty="0" smtClean="0"/>
+              <a:t>reserves </a:t>
+            </a:r>
+            <a:r>
+              <a:rPr lang="en-US" dirty="0"/>
+              <a:t>a particular DMA channel for exclusive use by a specific peripheral device. In a system with multiple DMA channels, channel locking allows a peripheral device to lock a particular channel for its own use, preventing other devices from accessing the same channel.</a:t>
+            </a:r>
+          </a:p>
+          <a:p>
+            <a:pPr marL="285750" indent="-285750" algn="just">
+              <a:buFont typeface="Arial" panose="020B0604020202020204" pitchFamily="34" charset="0"/>
+              <a:buChar char="•"/>
+            </a:pPr>
+            <a:endParaRPr lang="en-US" dirty="0"/>
+          </a:p>
+          <a:p>
+            <a:pPr marL="285750" indent="-285750" algn="just">
+              <a:buFont typeface="Arial" panose="020B0604020202020204" pitchFamily="34" charset="0"/>
+              <a:buChar char="•"/>
+            </a:pPr>
+            <a:r>
+              <a:rPr lang="en-US" dirty="0"/>
+              <a:t>Channel locking is typically implemented by setting a "lock bit" associated with each DMA channel. When a peripheral device needs to transfer data, it sets the lock bit for the desired channel, indicating that the channel is reserved for its use. Other peripheral devices can then request other available channels, or they can wait until the locked channel is released.</a:t>
+            </a:r>
+          </a:p>
+          <a:p>
+            <a:pPr marL="285750" indent="-285750" algn="just">
+              <a:buFont typeface="Arial" panose="020B0604020202020204" pitchFamily="34" charset="0"/>
+              <a:buChar char="•"/>
+            </a:pPr>
+            <a:endParaRPr lang="en-US" dirty="0"/>
+          </a:p>
+          <a:p>
+            <a:pPr marL="285750" indent="-285750" algn="just">
+              <a:buFont typeface="Arial" panose="020B0604020202020204" pitchFamily="34" charset="0"/>
+              <a:buChar char="•"/>
+            </a:pPr>
+            <a:r>
+              <a:rPr lang="en-US" dirty="0"/>
+              <a:t>Channel locking provides a mechanism for ensuring that the transfer of data from a peripheral device is performed in a timely and consistent manner, and it provides a mechanism for avoiding conflicts between different peripheral devices that might otherwise compete for access to the same DMA channel.</a:t>
+            </a:r>
+          </a:p>
+          <a:p>
+            <a:pPr marL="285750" indent="-285750" algn="just">
+              <a:buFont typeface="Arial" panose="020B0604020202020204" pitchFamily="34" charset="0"/>
+              <a:buChar char="•"/>
+            </a:pPr>
+            <a:endParaRPr lang="en-US" dirty="0"/>
+          </a:p>
+          <a:p>
+            <a:pPr marL="285750" indent="-285750" algn="just">
+              <a:buFont typeface="Arial" panose="020B0604020202020204" pitchFamily="34" charset="0"/>
+              <a:buChar char="•"/>
+            </a:pPr>
+            <a:r>
+              <a:rPr lang="en-US" dirty="0"/>
+              <a:t>It's important to note that the mechanism for implementing channel locking may vary depending on the specific DMA controller and system architecture, so it's important to consult the documentation for the specific controller to determine the available options and methods for implementing channel locking.</a:t>
+            </a:r>
+          </a:p>
+        </p:txBody>
+      </p:sp>
+    </p:spTree>
+    <p:extLst>
+      <p:ext uri="{BB962C8B-B14F-4D97-AF65-F5344CB8AC3E}">
+        <p14:creationId xmlns:p14="http://schemas.microsoft.com/office/powerpoint/2010/main" val="2233935416"/>
       </p:ext>
     </p:extLst>
   </p:cSld>

</xml_diff>